<commit_message>
Create About Kevin on slideshow
</commit_message>
<xml_diff>
--- a/ThatConference2022.pptx
+++ b/ThatConference2022.pptx
@@ -8,7 +8,7 @@
     <p:sldId id="256" r:id="rId2"/>
     <p:sldId id="257" r:id="rId3"/>
     <p:sldId id="258" r:id="rId4"/>
-    <p:sldId id="260" r:id="rId5"/>
+    <p:sldId id="273" r:id="rId5"/>
     <p:sldId id="261" r:id="rId6"/>
     <p:sldId id="272" r:id="rId7"/>
     <p:sldId id="266" r:id="rId8"/>
@@ -7444,14 +7444,6 @@
 <file path=ppt/slides/slide4.xml><?xml version="1.0" encoding="utf-8"?>
 <p:sld xmlns:a="http://schemas.openxmlformats.org/drawingml/2006/main" xmlns:r="http://schemas.openxmlformats.org/officeDocument/2006/relationships" xmlns:p="http://schemas.openxmlformats.org/presentationml/2006/main">
   <p:cSld>
-    <p:bg>
-      <p:bgPr>
-        <a:solidFill>
-          <a:schemeClr val="bg1"/>
-        </a:solidFill>
-        <a:effectLst/>
-      </p:bgPr>
-    </p:bg>
     <p:spTree>
       <p:nvGrpSpPr>
         <p:cNvPr id="1" name=""/>
@@ -7466,261 +7458,12 @@
           <a:chExt cx="0" cy="0"/>
         </a:xfrm>
       </p:grpSpPr>
-      <p:sp useBgFill="1">
-        <p:nvSpPr>
-          <p:cNvPr id="8" name="Rectangle 7">
-            <a:extLst>
-              <a:ext uri="{FF2B5EF4-FFF2-40B4-BE49-F238E27FC236}">
-                <a16:creationId xmlns:a16="http://schemas.microsoft.com/office/drawing/2014/main" id="{DAF1966E-FD40-4A4A-B61B-C4DF7FA05F06}"/>
-              </a:ext>
-              <a:ext uri="{C183D7F6-B498-43B3-948B-1728B52AA6E4}">
-                <adec:decorative xmlns:adec="http://schemas.microsoft.com/office/drawing/2017/decorative" val="1"/>
-              </a:ext>
-            </a:extLst>
-          </p:cNvPr>
-          <p:cNvSpPr>
-            <a:spLocks noGrp="1" noRot="1" noChangeAspect="1" noMove="1" noResize="1" noEditPoints="1" noAdjustHandles="1" noChangeArrowheads="1" noChangeShapeType="1" noTextEdit="1"/>
-          </p:cNvSpPr>
-          <p:nvPr>
-            <p:extLst>
-              <p:ext uri="{386F3935-93C4-4BCD-93E2-E3B085C9AB24}">
-                <p16:designElem xmlns:p16="http://schemas.microsoft.com/office/powerpoint/2015/main" val="1"/>
-              </p:ext>
-            </p:extLst>
-          </p:nvPr>
-        </p:nvSpPr>
-        <p:spPr>
-          <a:xfrm>
-            <a:off x="0" y="0"/>
-            <a:ext cx="12192000" cy="6858000"/>
-          </a:xfrm>
-          <a:prstGeom prst="rect">
-            <a:avLst/>
-          </a:prstGeom>
-          <a:ln>
-            <a:noFill/>
-          </a:ln>
-        </p:spPr>
-        <p:style>
-          <a:lnRef idx="2">
-            <a:schemeClr val="accent1">
-              <a:shade val="50000"/>
-            </a:schemeClr>
-          </a:lnRef>
-          <a:fillRef idx="1">
-            <a:schemeClr val="accent1"/>
-          </a:fillRef>
-          <a:effectRef idx="0">
-            <a:schemeClr val="accent1"/>
-          </a:effectRef>
-          <a:fontRef idx="minor">
-            <a:schemeClr val="lt1"/>
-          </a:fontRef>
-        </p:style>
-        <p:txBody>
-          <a:bodyPr rtlCol="0" anchor="ctr"/>
-          <a:lstStyle/>
-          <a:p>
-            <a:pPr algn="ctr"/>
-            <a:endParaRPr lang="en-US"/>
-          </a:p>
-        </p:txBody>
-      </p:sp>
-      <p:sp useBgFill="1">
-        <p:nvSpPr>
-          <p:cNvPr id="10" name="Rectangle 9">
-            <a:extLst>
-              <a:ext uri="{FF2B5EF4-FFF2-40B4-BE49-F238E27FC236}">
-                <a16:creationId xmlns:a16="http://schemas.microsoft.com/office/drawing/2014/main" id="{047BFA19-D45E-416B-A404-7AF2F3F27017}"/>
-              </a:ext>
-              <a:ext uri="{C183D7F6-B498-43B3-948B-1728B52AA6E4}">
-                <adec:decorative xmlns:adec="http://schemas.microsoft.com/office/drawing/2017/decorative" val="1"/>
-              </a:ext>
-            </a:extLst>
-          </p:cNvPr>
-          <p:cNvSpPr>
-            <a:spLocks noGrp="1" noRot="1" noChangeAspect="1" noMove="1" noResize="1" noEditPoints="1" noAdjustHandles="1" noChangeArrowheads="1" noChangeShapeType="1" noTextEdit="1"/>
-          </p:cNvSpPr>
-          <p:nvPr>
-            <p:extLst>
-              <p:ext uri="{386F3935-93C4-4BCD-93E2-E3B085C9AB24}">
-                <p16:designElem xmlns:p16="http://schemas.microsoft.com/office/powerpoint/2015/main" val="1"/>
-              </p:ext>
-            </p:extLst>
-          </p:nvPr>
-        </p:nvSpPr>
-        <p:spPr>
-          <a:xfrm>
-            <a:off x="558209" y="0"/>
-            <a:ext cx="11167447" cy="2018806"/>
-          </a:xfrm>
-          <a:prstGeom prst="rect">
-            <a:avLst/>
-          </a:prstGeom>
-          <a:ln w="9525">
-            <a:solidFill>
-              <a:srgbClr val="E1E1E1"/>
-            </a:solidFill>
-          </a:ln>
-          <a:effectLst>
-            <a:outerShdw blurRad="50800" dist="38100" dir="2700000" algn="tl" rotWithShape="0">
-              <a:schemeClr val="bg1">
-                <a:lumMod val="85000"/>
-                <a:alpha val="50000"/>
-              </a:schemeClr>
-            </a:outerShdw>
-          </a:effectLst>
-        </p:spPr>
-        <p:style>
-          <a:lnRef idx="2">
-            <a:schemeClr val="accent1">
-              <a:shade val="50000"/>
-            </a:schemeClr>
-          </a:lnRef>
-          <a:fillRef idx="1">
-            <a:schemeClr val="accent1"/>
-          </a:fillRef>
-          <a:effectRef idx="0">
-            <a:schemeClr val="accent1"/>
-          </a:effectRef>
-          <a:fontRef idx="minor">
-            <a:schemeClr val="lt1"/>
-          </a:fontRef>
-        </p:style>
-        <p:txBody>
-          <a:bodyPr rtlCol="0" anchor="ctr"/>
-          <a:lstStyle/>
-          <a:p>
-            <a:pPr marL="0" marR="0" lvl="0" indent="0" algn="ctr" defTabSz="914400" rtl="0" eaLnBrk="1" fontAlgn="auto" latinLnBrk="0" hangingPunct="1">
-              <a:lnSpc>
-                <a:spcPct val="100000"/>
-              </a:lnSpc>
-              <a:spcBef>
-                <a:spcPts val="0"/>
-              </a:spcBef>
-              <a:spcAft>
-                <a:spcPts val="0"/>
-              </a:spcAft>
-              <a:buClrTx/>
-              <a:buSzTx/>
-              <a:buFontTx/>
-              <a:buNone/>
-              <a:tabLst/>
-              <a:defRPr/>
-            </a:pPr>
-            <a:endParaRPr kumimoji="0" lang="en-US" sz="1800" b="0" i="0" u="none" strike="noStrike" kern="1200" cap="none" spc="0" normalizeH="0" baseline="0" noProof="0">
-              <a:ln>
-                <a:noFill/>
-              </a:ln>
-              <a:solidFill>
-                <a:prstClr val="white"/>
-              </a:solidFill>
-              <a:effectLst/>
-              <a:uLnTx/>
-              <a:uFillTx/>
-              <a:latin typeface="Calibri" panose="020F0502020204030204"/>
-              <a:ea typeface="+mn-ea"/>
-              <a:cs typeface="+mn-cs"/>
-            </a:endParaRPr>
-          </a:p>
-        </p:txBody>
-      </p:sp>
-      <p:sp useBgFill="1">
-        <p:nvSpPr>
-          <p:cNvPr id="12" name="Rectangle 11">
-            <a:extLst>
-              <a:ext uri="{FF2B5EF4-FFF2-40B4-BE49-F238E27FC236}">
-                <a16:creationId xmlns:a16="http://schemas.microsoft.com/office/drawing/2014/main" id="{8E0105E7-23DB-4CF2-8258-FF47C7620F6E}"/>
-              </a:ext>
-              <a:ext uri="{C183D7F6-B498-43B3-948B-1728B52AA6E4}">
-                <adec:decorative xmlns:adec="http://schemas.microsoft.com/office/drawing/2017/decorative" val="1"/>
-              </a:ext>
-            </a:extLst>
-          </p:cNvPr>
-          <p:cNvSpPr>
-            <a:spLocks noGrp="1" noRot="1" noChangeAspect="1" noMove="1" noResize="1" noEditPoints="1" noAdjustHandles="1" noChangeArrowheads="1" noChangeShapeType="1" noTextEdit="1"/>
-          </p:cNvSpPr>
-          <p:nvPr>
-            <p:extLst>
-              <p:ext uri="{386F3935-93C4-4BCD-93E2-E3B085C9AB24}">
-                <p16:designElem xmlns:p16="http://schemas.microsoft.com/office/powerpoint/2015/main" val="1"/>
-              </p:ext>
-            </p:extLst>
-          </p:nvPr>
-        </p:nvSpPr>
-        <p:spPr>
-          <a:xfrm>
-            <a:off x="566928" y="0"/>
-            <a:ext cx="11155680" cy="2011680"/>
-          </a:xfrm>
-          <a:prstGeom prst="rect">
-            <a:avLst/>
-          </a:prstGeom>
-          <a:ln w="9525">
-            <a:noFill/>
-          </a:ln>
-          <a:effectLst/>
-        </p:spPr>
-        <p:style>
-          <a:lnRef idx="2">
-            <a:schemeClr val="accent1">
-              <a:shade val="50000"/>
-            </a:schemeClr>
-          </a:lnRef>
-          <a:fillRef idx="1">
-            <a:schemeClr val="accent1"/>
-          </a:fillRef>
-          <a:effectRef idx="0">
-            <a:schemeClr val="accent1"/>
-          </a:effectRef>
-          <a:fontRef idx="minor">
-            <a:schemeClr val="lt1"/>
-          </a:fontRef>
-        </p:style>
-        <p:txBody>
-          <a:bodyPr rtlCol="0" anchor="ctr"/>
-          <a:lstStyle/>
-          <a:p>
-            <a:pPr marL="0" marR="0" lvl="0" indent="0" algn="ctr" defTabSz="914400" rtl="0" eaLnBrk="1" fontAlgn="auto" latinLnBrk="0" hangingPunct="1">
-              <a:lnSpc>
-                <a:spcPct val="100000"/>
-              </a:lnSpc>
-              <a:spcBef>
-                <a:spcPts val="0"/>
-              </a:spcBef>
-              <a:spcAft>
-                <a:spcPts val="0"/>
-              </a:spcAft>
-              <a:buClrTx/>
-              <a:buSzTx/>
-              <a:buFontTx/>
-              <a:buNone/>
-              <a:tabLst/>
-              <a:defRPr/>
-            </a:pPr>
-            <a:endParaRPr kumimoji="0" lang="en-US" sz="1800" b="0" i="0" u="none" strike="noStrike" kern="1200" cap="none" spc="0" normalizeH="0" baseline="0" noProof="0">
-              <a:ln>
-                <a:noFill/>
-              </a:ln>
-              <a:solidFill>
-                <a:prstClr val="white"/>
-              </a:solidFill>
-              <a:effectLst/>
-              <a:uLnTx/>
-              <a:uFillTx/>
-              <a:latin typeface="Calibri" panose="020F0502020204030204"/>
-              <a:ea typeface="+mn-ea"/>
-              <a:cs typeface="+mn-cs"/>
-            </a:endParaRPr>
-          </a:p>
-        </p:txBody>
-      </p:sp>
       <p:sp>
         <p:nvSpPr>
           <p:cNvPr id="2" name="Title 1">
             <a:extLst>
               <a:ext uri="{FF2B5EF4-FFF2-40B4-BE49-F238E27FC236}">
-                <a16:creationId xmlns:a16="http://schemas.microsoft.com/office/drawing/2014/main" id="{82CF4B60-062A-25CD-E448-6C8255EEF9CC}"/>
+                <a16:creationId xmlns:a16="http://schemas.microsoft.com/office/drawing/2014/main" id="{9347DB6B-8169-FEB2-EFE8-BB8ED29FEA2F}"/>
               </a:ext>
             </a:extLst>
           </p:cNvPr>
@@ -7731,185 +7474,30 @@
             <p:ph type="title"/>
           </p:nvPr>
         </p:nvSpPr>
-        <p:spPr>
-          <a:xfrm>
-            <a:off x="1115568" y="548640"/>
-            <a:ext cx="10168128" cy="1179576"/>
-          </a:xfrm>
-        </p:spPr>
-        <p:txBody>
-          <a:bodyPr>
-            <a:normAutofit/>
-          </a:bodyPr>
-          <a:lstStyle/>
-          <a:p>
-            <a:r>
-              <a:rPr lang="en-US" sz="4000" dirty="0"/>
-              <a:t>About us:</a:t>
-            </a:r>
-          </a:p>
-        </p:txBody>
-      </p:sp>
-      <p:sp>
-        <p:nvSpPr>
-          <p:cNvPr id="14" name="Rectangle 13">
+        <p:spPr/>
+        <p:txBody>
+          <a:bodyPr/>
+          <a:lstStyle/>
+          <a:p>
+            <a:endParaRPr lang="en-US"/>
+          </a:p>
+        </p:txBody>
+      </p:sp>
+      <p:pic>
+        <p:nvPicPr>
+          <p:cNvPr id="5" name="Content Placeholder 4">
             <a:extLst>
               <a:ext uri="{FF2B5EF4-FFF2-40B4-BE49-F238E27FC236}">
-                <a16:creationId xmlns:a16="http://schemas.microsoft.com/office/drawing/2014/main" id="{074B4F7D-14B2-478B-8BF5-01E4E0C5D263}"/>
-              </a:ext>
-              <a:ext uri="{C183D7F6-B498-43B3-948B-1728B52AA6E4}">
-                <adec:decorative xmlns:adec="http://schemas.microsoft.com/office/drawing/2017/decorative" val="1"/>
-              </a:ext>
-            </a:extLst>
-          </p:cNvPr>
-          <p:cNvSpPr>
-            <a:spLocks noGrp="1" noRot="1" noChangeAspect="1" noMove="1" noResize="1" noEditPoints="1" noAdjustHandles="1" noChangeArrowheads="1" noChangeShapeType="1" noTextEdit="1"/>
-          </p:cNvSpPr>
-          <p:nvPr>
-            <p:extLst>
-              <p:ext uri="{386F3935-93C4-4BCD-93E2-E3B085C9AB24}">
-                <p16:designElem xmlns:p16="http://schemas.microsoft.com/office/powerpoint/2015/main" val="1"/>
-              </p:ext>
-            </p:extLst>
-          </p:nvPr>
-        </p:nvSpPr>
-        <p:spPr>
-          <a:xfrm>
-            <a:off x="498834" y="758952"/>
-            <a:ext cx="128016" cy="704088"/>
-          </a:xfrm>
-          <a:prstGeom prst="rect">
-            <a:avLst/>
-          </a:prstGeom>
-          <a:solidFill>
-            <a:schemeClr val="accent2"/>
-          </a:solidFill>
-          <a:ln>
-            <a:noFill/>
-          </a:ln>
-        </p:spPr>
-        <p:style>
-          <a:lnRef idx="2">
-            <a:schemeClr val="accent1">
-              <a:shade val="50000"/>
-            </a:schemeClr>
-          </a:lnRef>
-          <a:fillRef idx="1">
-            <a:schemeClr val="accent1"/>
-          </a:fillRef>
-          <a:effectRef idx="0">
-            <a:schemeClr val="accent1"/>
-          </a:effectRef>
-          <a:fontRef idx="minor">
-            <a:schemeClr val="lt1"/>
-          </a:fontRef>
-        </p:style>
-        <p:txBody>
-          <a:bodyPr rtlCol="0" anchor="ctr"/>
-          <a:lstStyle/>
-          <a:p>
-            <a:pPr algn="ctr"/>
-            <a:endParaRPr lang="en-US">
-              <a:solidFill>
-                <a:prstClr val="white"/>
-              </a:solidFill>
-              <a:latin typeface="Calibri" panose="020F0502020204030204"/>
-            </a:endParaRPr>
-          </a:p>
-        </p:txBody>
-      </p:sp>
-      <p:sp>
-        <p:nvSpPr>
-          <p:cNvPr id="3" name="Content Placeholder 2">
-            <a:extLst>
-              <a:ext uri="{FF2B5EF4-FFF2-40B4-BE49-F238E27FC236}">
-                <a16:creationId xmlns:a16="http://schemas.microsoft.com/office/drawing/2014/main" id="{E43BD06B-906D-5C9C-E517-52B27F705E94}"/>
-              </a:ext>
-            </a:extLst>
-          </p:cNvPr>
-          <p:cNvSpPr>
-            <a:spLocks noGrp="1"/>
-          </p:cNvSpPr>
-          <p:nvPr>
-            <p:ph idx="1"/>
-          </p:nvPr>
-        </p:nvSpPr>
-        <p:spPr>
-          <a:xfrm>
-            <a:off x="1115568" y="2481943"/>
-            <a:ext cx="10168128" cy="3695020"/>
-          </a:xfrm>
-        </p:spPr>
-        <p:txBody>
-          <a:bodyPr>
-            <a:normAutofit/>
-          </a:bodyPr>
-          <a:lstStyle/>
-          <a:p>
-            <a:r>
-              <a:rPr lang="en-US" sz="2200" dirty="0"/>
-              <a:t>20 years lake co</a:t>
-            </a:r>
-          </a:p>
-          <a:p>
-            <a:r>
-              <a:rPr lang="en-US" sz="2200" dirty="0"/>
-              <a:t>Inventor patent</a:t>
-            </a:r>
-          </a:p>
-          <a:p>
-            <a:r>
-              <a:rPr lang="en-US" sz="2200" dirty="0"/>
-              <a:t>Microsoft certified developer</a:t>
-            </a:r>
-          </a:p>
-          <a:p>
-            <a:r>
-              <a:rPr lang="en-US" sz="2200" dirty="0"/>
-              <a:t>3x Hackathon winner</a:t>
-            </a:r>
-          </a:p>
-          <a:p>
-            <a:r>
-              <a:rPr lang="en-US" sz="2200" dirty="0"/>
-              <a:t>Christmas lightshow</a:t>
-            </a:r>
-          </a:p>
-          <a:p>
-            <a:r>
-              <a:rPr lang="en-US" sz="2200" dirty="0"/>
-              <a:t>Father of 5 girls</a:t>
-            </a:r>
-          </a:p>
-          <a:p>
-            <a:r>
-              <a:rPr lang="en-US" sz="2200" dirty="0"/>
-              <a:t>Daily </a:t>
-            </a:r>
-            <a:r>
-              <a:rPr lang="en-US" sz="2200" dirty="0" err="1"/>
-              <a:t>Github</a:t>
-            </a:r>
-            <a:r>
-              <a:rPr lang="en-US" sz="2200" dirty="0"/>
-              <a:t> commit Challenge</a:t>
-            </a:r>
-          </a:p>
-        </p:txBody>
-      </p:sp>
-      <p:pic>
-        <p:nvPicPr>
-          <p:cNvPr id="1026" name="Picture 2" descr="Employee Resume 8 PowerPoint Template">
-            <a:extLst>
-              <a:ext uri="{FF2B5EF4-FFF2-40B4-BE49-F238E27FC236}">
-                <a16:creationId xmlns:a16="http://schemas.microsoft.com/office/drawing/2014/main" id="{F3210187-00E2-CA7E-493A-E91917D1F46D}"/>
+                <a16:creationId xmlns:a16="http://schemas.microsoft.com/office/drawing/2014/main" id="{1F9F3CDF-1D7F-F41E-4914-6267C1B33BFD}"/>
               </a:ext>
             </a:extLst>
           </p:cNvPr>
           <p:cNvPicPr>
-            <a:picLocks noChangeAspect="1" noChangeArrowheads="1"/>
+            <a:picLocks noGrp="1" noChangeAspect="1"/>
           </p:cNvPicPr>
-          <p:nvPr/>
+          <p:nvPr>
+            <p:ph idx="1"/>
+          </p:nvPr>
         </p:nvPicPr>
         <p:blipFill>
           <a:blip r:embed="rId2">
@@ -7919,35 +7507,21 @@
               </a:ext>
             </a:extLst>
           </a:blip>
-          <a:srcRect/>
           <a:stretch>
             <a:fillRect/>
           </a:stretch>
         </p:blipFill>
-        <p:spPr bwMode="auto">
-          <a:xfrm>
-            <a:off x="4643628" y="352552"/>
-            <a:ext cx="7315200" cy="5486400"/>
-          </a:xfrm>
-          <a:prstGeom prst="rect">
-            <a:avLst/>
-          </a:prstGeom>
-          <a:noFill/>
-          <a:extLst>
-            <a:ext uri="{909E8E84-426E-40DD-AFC4-6F175D3DCCD1}">
-              <a14:hiddenFill xmlns:a14="http://schemas.microsoft.com/office/drawing/2010/main">
-                <a:solidFill>
-                  <a:srgbClr val="FFFFFF"/>
-                </a:solidFill>
-              </a14:hiddenFill>
-            </a:ext>
-          </a:extLst>
+        <p:spPr>
+          <a:xfrm>
+            <a:off x="177800" y="0"/>
+            <a:ext cx="11836400" cy="6923686"/>
+          </a:xfrm>
         </p:spPr>
       </p:pic>
     </p:spTree>
     <p:extLst>
       <p:ext uri="{BB962C8B-B14F-4D97-AF65-F5344CB8AC3E}">
-        <p14:creationId xmlns:p14="http://schemas.microsoft.com/office/powerpoint/2010/main" val="908212866"/>
+        <p14:creationId xmlns:p14="http://schemas.microsoft.com/office/powerpoint/2010/main" val="2826635753"/>
       </p:ext>
     </p:extLst>
   </p:cSld>

</xml_diff>

<commit_message>
some tweaks to presentation
</commit_message>
<xml_diff>
--- a/ThatConference2022.pptx
+++ b/ThatConference2022.pptx
@@ -15,13 +15,13 @@
     <p:sldId id="293" r:id="rId9"/>
     <p:sldId id="264" r:id="rId10"/>
     <p:sldId id="275" r:id="rId11"/>
-    <p:sldId id="262" r:id="rId12"/>
-    <p:sldId id="265" r:id="rId13"/>
-    <p:sldId id="267" r:id="rId14"/>
-    <p:sldId id="291" r:id="rId15"/>
-    <p:sldId id="292" r:id="rId16"/>
-    <p:sldId id="268" r:id="rId17"/>
-    <p:sldId id="269" r:id="rId18"/>
+    <p:sldId id="265" r:id="rId12"/>
+    <p:sldId id="267" r:id="rId13"/>
+    <p:sldId id="291" r:id="rId14"/>
+    <p:sldId id="292" r:id="rId15"/>
+    <p:sldId id="268" r:id="rId16"/>
+    <p:sldId id="269" r:id="rId17"/>
+    <p:sldId id="262" r:id="rId18"/>
     <p:sldId id="270" r:id="rId19"/>
     <p:sldId id="271" r:id="rId20"/>
     <p:sldId id="276" r:id="rId21"/>
@@ -151,13 +151,13 @@
             <p14:sldId id="293"/>
             <p14:sldId id="264"/>
             <p14:sldId id="275"/>
-            <p14:sldId id="262"/>
             <p14:sldId id="265"/>
             <p14:sldId id="267"/>
             <p14:sldId id="291"/>
             <p14:sldId id="292"/>
             <p14:sldId id="268"/>
             <p14:sldId id="269"/>
+            <p14:sldId id="262"/>
             <p14:sldId id="270"/>
             <p14:sldId id="271"/>
             <p14:sldId id="276"/>
@@ -3869,7 +3869,7 @@
           <a:lstStyle/>
           <a:p>
             <a:pPr algn="ctr"/>
-            <a:endParaRPr lang="en-US" dirty="0"/>
+            <a:endParaRPr lang="en-US"/>
           </a:p>
         </p:txBody>
       </p:sp>
@@ -4003,7 +4003,7 @@
           <a:lstStyle/>
           <a:p>
             <a:pPr algn="ctr"/>
-            <a:endParaRPr lang="en-US" dirty="0"/>
+            <a:endParaRPr lang="en-US"/>
           </a:p>
         </p:txBody>
       </p:sp>
@@ -4025,8 +4025,8 @@
         </p:nvSpPr>
         <p:spPr>
           <a:xfrm>
-            <a:off x="177800" y="1198418"/>
-            <a:ext cx="3606800" cy="4461163"/>
+            <a:off x="686834" y="1153572"/>
+            <a:ext cx="3200400" cy="4461163"/>
           </a:xfrm>
         </p:spPr>
         <p:txBody>
@@ -4042,7 +4042,7 @@
                   <a:srgbClr val="FFFFFF"/>
                 </a:solidFill>
               </a:rPr>
-              <a:t>How we started</a:t>
+              <a:t>C# Console Apps</a:t>
             </a:r>
           </a:p>
         </p:txBody>
@@ -4126,8 +4126,8 @@
         </p:nvSpPr>
         <p:spPr>
           <a:xfrm>
-            <a:off x="4447308" y="965200"/>
-            <a:ext cx="6906491" cy="5211763"/>
+            <a:off x="4447308" y="591344"/>
+            <a:ext cx="6906491" cy="5585619"/>
           </a:xfrm>
         </p:spPr>
         <p:txBody>
@@ -4138,79 +4138,24 @@
           <a:p>
             <a:r>
               <a:rPr lang="en-US" dirty="0"/>
-              <a:t>Age 6 Scratch and Hour of Code</a:t>
-            </a:r>
+              <a:t>Guess a number</a:t>
+            </a:r>
+          </a:p>
+          <a:p>
+            <a:r>
+              <a:rPr lang="en-US" dirty="0" err="1"/>
+              <a:t>MadLibs</a:t>
+            </a:r>
+            <a:endParaRPr lang="en-US" dirty="0"/>
           </a:p>
           <a:p>
             <a:r>
               <a:rPr lang="en-US" dirty="0"/>
-              <a:t>Age 7 Subscription Boxes </a:t>
-            </a:r>
-            <a:r>
-              <a:rPr lang="en-US" dirty="0" err="1"/>
-              <a:t>KiwiCo</a:t>
-            </a:r>
-            <a:r>
-              <a:rPr lang="en-US" dirty="0"/>
-              <a:t>/</a:t>
-            </a:r>
-            <a:r>
-              <a:rPr lang="en-US" dirty="0" err="1"/>
-              <a:t>MakerBlock</a:t>
-            </a:r>
-            <a:endParaRPr lang="en-US" dirty="0"/>
-          </a:p>
-          <a:p>
-            <a:r>
-              <a:rPr lang="en-US" dirty="0"/>
-              <a:t>Age 8/9 C# Console Apps</a:t>
-            </a:r>
-          </a:p>
-          <a:p>
-            <a:r>
-              <a:rPr lang="en-US" dirty="0"/>
-              <a:t>Age 9 Unity</a:t>
-            </a:r>
-          </a:p>
-          <a:p>
-            <a:r>
-              <a:rPr lang="en-US" dirty="0"/>
-              <a:t>Age 10+ HTML/Web/</a:t>
-            </a:r>
-            <a:r>
-              <a:rPr lang="en-US" dirty="0" err="1"/>
-              <a:t>Blazor</a:t>
-            </a:r>
-            <a:endParaRPr lang="en-US" dirty="0"/>
-          </a:p>
-          <a:p>
-            <a:r>
-              <a:rPr lang="en-US" dirty="0"/>
-              <a:t>End Goal  C# </a:t>
-            </a:r>
-            <a:r>
-              <a:rPr lang="en-US" dirty="0" err="1"/>
-              <a:t>Blazor</a:t>
-            </a:r>
-            <a:r>
-              <a:rPr lang="en-US" dirty="0"/>
-              <a:t> Web API</a:t>
-            </a:r>
-          </a:p>
-          <a:p>
-            <a:pPr marL="0" indent="0">
-              <a:buNone/>
-            </a:pPr>
-            <a:endParaRPr lang="en-US" sz="2000" dirty="0"/>
-          </a:p>
-          <a:p>
-            <a:pPr marL="0" indent="0">
-              <a:buNone/>
-            </a:pPr>
-            <a:r>
-              <a:rPr lang="en-US" sz="2000" dirty="0"/>
-              <a:t>10 years old is the optimal time to learn programming.  Yet the earlier the better.</a:t>
-            </a:r>
+              <a:t>Rock Paper Scissors</a:t>
+            </a:r>
+          </a:p>
+          <a:p>
+            <a:pPr lvl="1"/>
             <a:endParaRPr lang="en-US" dirty="0"/>
           </a:p>
         </p:txBody>
@@ -4218,7 +4163,7 @@
     </p:spTree>
     <p:extLst>
       <p:ext uri="{BB962C8B-B14F-4D97-AF65-F5344CB8AC3E}">
-        <p14:creationId xmlns:p14="http://schemas.microsoft.com/office/powerpoint/2010/main" val="3799559141"/>
+        <p14:creationId xmlns:p14="http://schemas.microsoft.com/office/powerpoint/2010/main" val="1458746974"/>
       </p:ext>
     </p:extLst>
   </p:cSld>
@@ -4475,14 +4420,13 @@
           </a:bodyPr>
           <a:lstStyle/>
           <a:p>
-            <a:pPr algn="ctr"/>
             <a:r>
               <a:rPr lang="en-US" dirty="0">
                 <a:solidFill>
                   <a:srgbClr val="FFFFFF"/>
                 </a:solidFill>
               </a:rPr>
-              <a:t>C# Console Apps</a:t>
+              <a:t>Unity</a:t>
             </a:r>
           </a:p>
         </p:txBody>
@@ -4578,30 +4522,72 @@
           <a:p>
             <a:r>
               <a:rPr lang="en-US" dirty="0"/>
-              <a:t>Guess a number</a:t>
-            </a:r>
-          </a:p>
-          <a:p>
+              <a:t>YouTube/</a:t>
+            </a:r>
             <a:r>
               <a:rPr lang="en-US" dirty="0" err="1"/>
-              <a:t>MadLibs</a:t>
+              <a:t>Brackeys</a:t>
             </a:r>
             <a:endParaRPr lang="en-US" dirty="0"/>
           </a:p>
           <a:p>
             <a:r>
               <a:rPr lang="en-US" dirty="0"/>
-              <a:t>Rock Paper Scissors</a:t>
-            </a:r>
+              <a:t>Cosmic Battle</a:t>
+            </a:r>
+          </a:p>
+          <a:p>
+            <a:pPr lvl="1"/>
+            <a:r>
+              <a:rPr lang="en-US" dirty="0">
+                <a:hlinkClick r:id="rId2"/>
+              </a:rPr>
+              <a:t>https://kevmoens.s3.amazonaws.com/CosmicBattle/index.html</a:t>
+            </a:r>
+            <a:endParaRPr lang="en-US" dirty="0"/>
           </a:p>
           <a:p>
             <a:r>
               <a:rPr lang="en-US" dirty="0"/>
-              <a:t>Tic Tac Toe</a:t>
+              <a:t>Lego – Unity Tutorial</a:t>
             </a:r>
           </a:p>
           <a:p>
             <a:pPr lvl="1"/>
+            <a:r>
+              <a:rPr lang="en-US" dirty="0">
+                <a:hlinkClick r:id="rId3"/>
+              </a:rPr>
+              <a:t>https://kevmoens.s3.amazonaws.com/LegoSampleGame/index.html</a:t>
+            </a:r>
+            <a:endParaRPr lang="en-US" dirty="0"/>
+          </a:p>
+          <a:p>
+            <a:r>
+              <a:rPr lang="en-US" dirty="0"/>
+              <a:t>Matt Ramage – Green Bay Packers Podcaster</a:t>
+            </a:r>
+          </a:p>
+          <a:p>
+            <a:pPr lvl="1"/>
+            <a:r>
+              <a:rPr lang="en-US" dirty="0">
+                <a:hlinkClick r:id="rId4"/>
+              </a:rPr>
+              <a:t>Unity WebGL Player | </a:t>
+            </a:r>
+            <a:r>
+              <a:rPr lang="en-US" dirty="0" err="1">
+                <a:hlinkClick r:id="rId4"/>
+              </a:rPr>
+              <a:t>MattRamage</a:t>
+            </a:r>
+            <a:r>
+              <a:rPr lang="en-US" dirty="0">
+                <a:hlinkClick r:id="rId4"/>
+              </a:rPr>
+              <a:t> (kevmoens.s3.amazonaws.com)</a:t>
+            </a:r>
             <a:endParaRPr lang="en-US" dirty="0"/>
           </a:p>
         </p:txBody>
@@ -4609,7 +4595,7 @@
     </p:spTree>
     <p:extLst>
       <p:ext uri="{BB962C8B-B14F-4D97-AF65-F5344CB8AC3E}">
-        <p14:creationId xmlns:p14="http://schemas.microsoft.com/office/powerpoint/2010/main" val="1458746974"/>
+        <p14:creationId xmlns:p14="http://schemas.microsoft.com/office/powerpoint/2010/main" val="825674288"/>
       </p:ext>
     </p:extLst>
   </p:cSld>
@@ -4700,7 +4686,7 @@
           <a:lstStyle/>
           <a:p>
             <a:pPr algn="ctr"/>
-            <a:endParaRPr lang="en-US"/>
+            <a:endParaRPr lang="en-US" dirty="0"/>
           </a:p>
         </p:txBody>
       </p:sp>
@@ -4834,7 +4820,7 @@
           <a:lstStyle/>
           <a:p>
             <a:pPr algn="ctr"/>
-            <a:endParaRPr lang="en-US"/>
+            <a:endParaRPr lang="en-US" dirty="0"/>
           </a:p>
         </p:txBody>
       </p:sp>
@@ -4856,8 +4842,8 @@
         </p:nvSpPr>
         <p:spPr>
           <a:xfrm>
-            <a:off x="686834" y="1153572"/>
-            <a:ext cx="3200400" cy="4461163"/>
+            <a:off x="0" y="1153572"/>
+            <a:ext cx="3530601" cy="4461163"/>
           </a:xfrm>
         </p:spPr>
         <p:txBody>
@@ -4866,6 +4852,7 @@
           </a:bodyPr>
           <a:lstStyle/>
           <a:p>
+            <a:pPr algn="ctr"/>
             <a:r>
               <a:rPr lang="en-US" dirty="0">
                 <a:solidFill>
@@ -4938,12 +4925,42 @@
           </a:p>
         </p:txBody>
       </p:sp>
-      <p:sp>
-        <p:nvSpPr>
-          <p:cNvPr id="3" name="Content Placeholder 2">
-            <a:extLst>
-              <a:ext uri="{FF2B5EF4-FFF2-40B4-BE49-F238E27FC236}">
-                <a16:creationId xmlns:a16="http://schemas.microsoft.com/office/drawing/2014/main" id="{506ECF03-3832-CE61-45EB-6C148D597A92}"/>
+      <p:pic>
+        <p:nvPicPr>
+          <p:cNvPr id="4" name="Picture 3">
+            <a:extLst>
+              <a:ext uri="{FF2B5EF4-FFF2-40B4-BE49-F238E27FC236}">
+                <a16:creationId xmlns:a16="http://schemas.microsoft.com/office/drawing/2014/main" id="{BA40EFC6-460A-48D4-329F-90F0FEB3AC4D}"/>
+              </a:ext>
+            </a:extLst>
+          </p:cNvPr>
+          <p:cNvPicPr>
+            <a:picLocks noChangeAspect="1"/>
+          </p:cNvPicPr>
+          <p:nvPr/>
+        </p:nvPicPr>
+        <p:blipFill>
+          <a:blip r:embed="rId2"/>
+          <a:stretch>
+            <a:fillRect/>
+          </a:stretch>
+        </p:blipFill>
+        <p:spPr>
+          <a:xfrm>
+            <a:off x="4238821" y="936381"/>
+            <a:ext cx="7919826" cy="4965262"/>
+          </a:xfrm>
+          <a:prstGeom prst="rect">
+            <a:avLst/>
+          </a:prstGeom>
+        </p:spPr>
+      </p:pic>
+      <p:sp>
+        <p:nvSpPr>
+          <p:cNvPr id="5" name="Content Placeholder 4">
+            <a:extLst>
+              <a:ext uri="{FF2B5EF4-FFF2-40B4-BE49-F238E27FC236}">
+                <a16:creationId xmlns:a16="http://schemas.microsoft.com/office/drawing/2014/main" id="{B0A22B86-4DA7-300D-55FB-64150FB540F0}"/>
               </a:ext>
             </a:extLst>
           </p:cNvPr>
@@ -4954,94 +4971,19 @@
             <p:ph idx="1"/>
           </p:nvPr>
         </p:nvSpPr>
-        <p:spPr>
-          <a:xfrm>
-            <a:off x="4447308" y="591344"/>
-            <a:ext cx="6906491" cy="5585619"/>
-          </a:xfrm>
-        </p:spPr>
-        <p:txBody>
-          <a:bodyPr anchor="ctr">
-            <a:normAutofit/>
-          </a:bodyPr>
-          <a:lstStyle/>
-          <a:p>
-            <a:r>
-              <a:rPr lang="en-US" dirty="0"/>
-              <a:t>YouTube/</a:t>
-            </a:r>
-            <a:r>
-              <a:rPr lang="en-US" dirty="0" err="1"/>
-              <a:t>Brackeys</a:t>
-            </a:r>
-            <a:endParaRPr lang="en-US" dirty="0"/>
-          </a:p>
-          <a:p>
-            <a:r>
-              <a:rPr lang="en-US" dirty="0"/>
-              <a:t>Cosmic Battle</a:t>
-            </a:r>
-          </a:p>
-          <a:p>
-            <a:pPr lvl="1"/>
-            <a:r>
-              <a:rPr lang="en-US" dirty="0">
-                <a:hlinkClick r:id="rId2"/>
-              </a:rPr>
-              <a:t>https://kevmoens.s3.amazonaws.com/CosmicBattle/index.html</a:t>
-            </a:r>
-            <a:endParaRPr lang="en-US" dirty="0"/>
-          </a:p>
-          <a:p>
-            <a:r>
-              <a:rPr lang="en-US" dirty="0"/>
-              <a:t>Lego – Unity Tutorial</a:t>
-            </a:r>
-          </a:p>
-          <a:p>
-            <a:pPr lvl="1"/>
-            <a:r>
-              <a:rPr lang="en-US" dirty="0">
-                <a:hlinkClick r:id="rId3"/>
-              </a:rPr>
-              <a:t>https://kevmoens.s3.amazonaws.com/LegoSampleGame/index.html</a:t>
-            </a:r>
-            <a:endParaRPr lang="en-US" dirty="0"/>
-          </a:p>
-          <a:p>
-            <a:r>
-              <a:rPr lang="en-US" dirty="0"/>
-              <a:t>Matt Ramage – Green Bay Packers Podcaster</a:t>
-            </a:r>
-          </a:p>
-          <a:p>
-            <a:pPr lvl="1"/>
-            <a:r>
-              <a:rPr lang="en-US" dirty="0">
-                <a:hlinkClick r:id="rId4"/>
-              </a:rPr>
-              <a:t>Unity WebGL Player | </a:t>
-            </a:r>
-            <a:r>
-              <a:rPr lang="en-US" dirty="0" err="1">
-                <a:hlinkClick r:id="rId4"/>
-              </a:rPr>
-              <a:t>MattRamage</a:t>
-            </a:r>
-            <a:r>
-              <a:rPr lang="en-US" dirty="0">
-                <a:hlinkClick r:id="rId4"/>
-              </a:rPr>
-              <a:t> (kevmoens.s3.amazonaws.com)</a:t>
-            </a:r>
-            <a:endParaRPr lang="en-US" dirty="0"/>
+        <p:spPr/>
+        <p:txBody>
+          <a:bodyPr/>
+          <a:lstStyle/>
+          <a:p>
+            <a:endParaRPr lang="en-US"/>
           </a:p>
         </p:txBody>
       </p:sp>
     </p:spTree>
     <p:extLst>
       <p:ext uri="{BB962C8B-B14F-4D97-AF65-F5344CB8AC3E}">
-        <p14:creationId xmlns:p14="http://schemas.microsoft.com/office/powerpoint/2010/main" val="825674288"/>
+        <p14:creationId xmlns:p14="http://schemas.microsoft.com/office/powerpoint/2010/main" val="3433420253"/>
       </p:ext>
     </p:extLst>
   </p:cSld>
@@ -5305,7 +5247,7 @@
                   <a:srgbClr val="FFFFFF"/>
                 </a:solidFill>
               </a:rPr>
-              <a:t>Unity</a:t>
+              <a:t>Flexbox Froggy</a:t>
             </a:r>
           </a:p>
         </p:txBody>
@@ -5371,12 +5313,37 @@
           </a:p>
         </p:txBody>
       </p:sp>
+      <p:sp>
+        <p:nvSpPr>
+          <p:cNvPr id="5" name="Content Placeholder 4">
+            <a:extLst>
+              <a:ext uri="{FF2B5EF4-FFF2-40B4-BE49-F238E27FC236}">
+                <a16:creationId xmlns:a16="http://schemas.microsoft.com/office/drawing/2014/main" id="{B0A22B86-4DA7-300D-55FB-64150FB540F0}"/>
+              </a:ext>
+            </a:extLst>
+          </p:cNvPr>
+          <p:cNvSpPr>
+            <a:spLocks noGrp="1"/>
+          </p:cNvSpPr>
+          <p:nvPr>
+            <p:ph idx="1"/>
+          </p:nvPr>
+        </p:nvSpPr>
+        <p:spPr/>
+        <p:txBody>
+          <a:bodyPr/>
+          <a:lstStyle/>
+          <a:p>
+            <a:endParaRPr lang="en-US" dirty="0"/>
+          </a:p>
+        </p:txBody>
+      </p:sp>
       <p:pic>
         <p:nvPicPr>
-          <p:cNvPr id="4" name="Picture 3">
-            <a:extLst>
-              <a:ext uri="{FF2B5EF4-FFF2-40B4-BE49-F238E27FC236}">
-                <a16:creationId xmlns:a16="http://schemas.microsoft.com/office/drawing/2014/main" id="{BA40EFC6-460A-48D4-329F-90F0FEB3AC4D}"/>
+          <p:cNvPr id="6" name="Picture 5">
+            <a:extLst>
+              <a:ext uri="{FF2B5EF4-FFF2-40B4-BE49-F238E27FC236}">
+                <a16:creationId xmlns:a16="http://schemas.microsoft.com/office/drawing/2014/main" id="{767A8721-A96B-EA97-1056-5D6DA19B4D74}"/>
               </a:ext>
             </a:extLst>
           </p:cNvPr>
@@ -5393,43 +5360,18 @@
         </p:blipFill>
         <p:spPr>
           <a:xfrm>
-            <a:off x="4238821" y="936381"/>
-            <a:ext cx="7919826" cy="4965262"/>
+            <a:off x="4167272" y="1378021"/>
+            <a:ext cx="8021680" cy="3955360"/>
           </a:xfrm>
           <a:prstGeom prst="rect">
             <a:avLst/>
           </a:prstGeom>
         </p:spPr>
       </p:pic>
-      <p:sp>
-        <p:nvSpPr>
-          <p:cNvPr id="5" name="Content Placeholder 4">
-            <a:extLst>
-              <a:ext uri="{FF2B5EF4-FFF2-40B4-BE49-F238E27FC236}">
-                <a16:creationId xmlns:a16="http://schemas.microsoft.com/office/drawing/2014/main" id="{B0A22B86-4DA7-300D-55FB-64150FB540F0}"/>
-              </a:ext>
-            </a:extLst>
-          </p:cNvPr>
-          <p:cNvSpPr>
-            <a:spLocks noGrp="1"/>
-          </p:cNvSpPr>
-          <p:nvPr>
-            <p:ph idx="1"/>
-          </p:nvPr>
-        </p:nvSpPr>
-        <p:spPr/>
-        <p:txBody>
-          <a:bodyPr/>
-          <a:lstStyle/>
-          <a:p>
-            <a:endParaRPr lang="en-US"/>
-          </a:p>
-        </p:txBody>
-      </p:sp>
     </p:spTree>
     <p:extLst>
       <p:ext uri="{BB962C8B-B14F-4D97-AF65-F5344CB8AC3E}">
-        <p14:creationId xmlns:p14="http://schemas.microsoft.com/office/powerpoint/2010/main" val="3433420253"/>
+        <p14:creationId xmlns:p14="http://schemas.microsoft.com/office/powerpoint/2010/main" val="1391188682"/>
       </p:ext>
     </p:extLst>
   </p:cSld>
@@ -5520,7 +5462,7 @@
           <a:lstStyle/>
           <a:p>
             <a:pPr algn="ctr"/>
-            <a:endParaRPr lang="en-US" dirty="0"/>
+            <a:endParaRPr lang="en-US"/>
           </a:p>
         </p:txBody>
       </p:sp>
@@ -5654,7 +5596,7 @@
           <a:lstStyle/>
           <a:p>
             <a:pPr algn="ctr"/>
-            <a:endParaRPr lang="en-US" dirty="0"/>
+            <a:endParaRPr lang="en-US"/>
           </a:p>
         </p:txBody>
       </p:sp>
@@ -5676,8 +5618,8 @@
         </p:nvSpPr>
         <p:spPr>
           <a:xfrm>
-            <a:off x="0" y="1153572"/>
-            <a:ext cx="3530601" cy="4461163"/>
+            <a:off x="686834" y="1153572"/>
+            <a:ext cx="3200400" cy="4461163"/>
           </a:xfrm>
         </p:spPr>
         <p:txBody>
@@ -5693,8 +5635,43 @@
                   <a:srgbClr val="FFFFFF"/>
                 </a:solidFill>
               </a:rPr>
-              <a:t>Flexbox Froggy</a:t>
-            </a:r>
+              <a:t>HTML</a:t>
+            </a:r>
+            <a:br>
+              <a:rPr lang="en-US" dirty="0">
+                <a:solidFill>
+                  <a:srgbClr val="FFFFFF"/>
+                </a:solidFill>
+              </a:rPr>
+            </a:br>
+            <a:r>
+              <a:rPr lang="en-US" dirty="0">
+                <a:solidFill>
+                  <a:srgbClr val="FFFFFF"/>
+                </a:solidFill>
+              </a:rPr>
+              <a:t>Web</a:t>
+            </a:r>
+            <a:br>
+              <a:rPr lang="en-US" dirty="0">
+                <a:solidFill>
+                  <a:srgbClr val="FFFFFF"/>
+                </a:solidFill>
+              </a:rPr>
+            </a:br>
+            <a:r>
+              <a:rPr lang="en-US" dirty="0" err="1">
+                <a:solidFill>
+                  <a:srgbClr val="FFFFFF"/>
+                </a:solidFill>
+              </a:rPr>
+              <a:t>Blazor</a:t>
+            </a:r>
+            <a:endParaRPr lang="en-US" dirty="0">
+              <a:solidFill>
+                <a:srgbClr val="FFFFFF"/>
+              </a:solidFill>
+            </a:endParaRPr>
           </a:p>
         </p:txBody>
       </p:sp>
@@ -5761,10 +5738,10 @@
       </p:sp>
       <p:sp>
         <p:nvSpPr>
-          <p:cNvPr id="5" name="Content Placeholder 4">
-            <a:extLst>
-              <a:ext uri="{FF2B5EF4-FFF2-40B4-BE49-F238E27FC236}">
-                <a16:creationId xmlns:a16="http://schemas.microsoft.com/office/drawing/2014/main" id="{B0A22B86-4DA7-300D-55FB-64150FB540F0}"/>
+          <p:cNvPr id="3" name="Content Placeholder 2">
+            <a:extLst>
+              <a:ext uri="{FF2B5EF4-FFF2-40B4-BE49-F238E27FC236}">
+                <a16:creationId xmlns:a16="http://schemas.microsoft.com/office/drawing/2014/main" id="{506ECF03-3832-CE61-45EB-6C148D597A92}"/>
               </a:ext>
             </a:extLst>
           </p:cNvPr>
@@ -5775,49 +5752,61 @@
             <p:ph idx="1"/>
           </p:nvPr>
         </p:nvSpPr>
-        <p:spPr/>
-        <p:txBody>
-          <a:bodyPr/>
-          <a:lstStyle/>
-          <a:p>
+        <p:spPr>
+          <a:xfrm>
+            <a:off x="4447308" y="591344"/>
+            <a:ext cx="6906491" cy="5585619"/>
+          </a:xfrm>
+        </p:spPr>
+        <p:txBody>
+          <a:bodyPr anchor="ctr">
+            <a:normAutofit/>
+          </a:bodyPr>
+          <a:lstStyle/>
+          <a:p>
+            <a:r>
+              <a:rPr lang="en-US" dirty="0"/>
+              <a:t>Free Code Camp</a:t>
+            </a:r>
+          </a:p>
+          <a:p>
+            <a:r>
+              <a:rPr lang="en-US" dirty="0"/>
+              <a:t>Flexbox Froggy</a:t>
+            </a:r>
+          </a:p>
+          <a:p>
+            <a:r>
+              <a:rPr lang="en-US" dirty="0"/>
+              <a:t>Grid Garden</a:t>
+            </a:r>
+          </a:p>
+          <a:p>
+            <a:r>
+              <a:rPr lang="en-US" dirty="0"/>
+              <a:t>Microsoft Learn</a:t>
+            </a:r>
+          </a:p>
+          <a:p>
+            <a:r>
+              <a:rPr lang="en-US" dirty="0"/>
+              <a:t>Tim Corey C# Challenge using GitHub OSS</a:t>
+            </a:r>
+          </a:p>
+          <a:p>
+            <a:pPr lvl="1"/>
+            <a:r>
+              <a:rPr lang="en-US" dirty="0" err="1"/>
+              <a:t>Wuphf</a:t>
+            </a:r>
             <a:endParaRPr lang="en-US" dirty="0"/>
           </a:p>
         </p:txBody>
       </p:sp>
-      <p:pic>
-        <p:nvPicPr>
-          <p:cNvPr id="6" name="Picture 5">
-            <a:extLst>
-              <a:ext uri="{FF2B5EF4-FFF2-40B4-BE49-F238E27FC236}">
-                <a16:creationId xmlns:a16="http://schemas.microsoft.com/office/drawing/2014/main" id="{767A8721-A96B-EA97-1056-5D6DA19B4D74}"/>
-              </a:ext>
-            </a:extLst>
-          </p:cNvPr>
-          <p:cNvPicPr>
-            <a:picLocks noChangeAspect="1"/>
-          </p:cNvPicPr>
-          <p:nvPr/>
-        </p:nvPicPr>
-        <p:blipFill>
-          <a:blip r:embed="rId2"/>
-          <a:stretch>
-            <a:fillRect/>
-          </a:stretch>
-        </p:blipFill>
-        <p:spPr>
-          <a:xfrm>
-            <a:off x="4167272" y="1378021"/>
-            <a:ext cx="8021680" cy="3955360"/>
-          </a:xfrm>
-          <a:prstGeom prst="rect">
-            <a:avLst/>
-          </a:prstGeom>
-        </p:spPr>
-      </p:pic>
     </p:spTree>
     <p:extLst>
       <p:ext uri="{BB962C8B-B14F-4D97-AF65-F5344CB8AC3E}">
-        <p14:creationId xmlns:p14="http://schemas.microsoft.com/office/powerpoint/2010/main" val="1391188682"/>
+        <p14:creationId xmlns:p14="http://schemas.microsoft.com/office/powerpoint/2010/main" val="1325740911"/>
       </p:ext>
     </p:extLst>
   </p:cSld>
@@ -6074,37 +6063,6 @@
           </a:bodyPr>
           <a:lstStyle/>
           <a:p>
-            <a:pPr algn="ctr"/>
-            <a:r>
-              <a:rPr lang="en-US" dirty="0">
-                <a:solidFill>
-                  <a:srgbClr val="FFFFFF"/>
-                </a:solidFill>
-              </a:rPr>
-              <a:t>HTML</a:t>
-            </a:r>
-            <a:br>
-              <a:rPr lang="en-US" dirty="0">
-                <a:solidFill>
-                  <a:srgbClr val="FFFFFF"/>
-                </a:solidFill>
-              </a:rPr>
-            </a:br>
-            <a:r>
-              <a:rPr lang="en-US" dirty="0">
-                <a:solidFill>
-                  <a:srgbClr val="FFFFFF"/>
-                </a:solidFill>
-              </a:rPr>
-              <a:t>Web</a:t>
-            </a:r>
-            <a:br>
-              <a:rPr lang="en-US" dirty="0">
-                <a:solidFill>
-                  <a:srgbClr val="FFFFFF"/>
-                </a:solidFill>
-              </a:rPr>
-            </a:br>
             <a:r>
               <a:rPr lang="en-US" dirty="0" err="1">
                 <a:solidFill>
@@ -6200,7 +6158,7 @@
         </p:nvSpPr>
         <p:spPr>
           <a:xfrm>
-            <a:off x="4447308" y="591344"/>
+            <a:off x="4447308" y="636190"/>
             <a:ext cx="6906491" cy="5585619"/>
           </a:xfrm>
         </p:spPr>
@@ -6210,40 +6168,66 @@
           </a:bodyPr>
           <a:lstStyle/>
           <a:p>
+            <a:pPr marL="0" indent="0" algn="ctr">
+              <a:buNone/>
+            </a:pPr>
+            <a:r>
+              <a:rPr lang="en-US" sz="3200" dirty="0"/>
+              <a:t>Projects</a:t>
+            </a:r>
+            <a:endParaRPr lang="en-US" dirty="0"/>
+          </a:p>
+          <a:p>
+            <a:r>
+              <a:rPr lang="en-US" dirty="0" err="1"/>
+              <a:t>Madlibs</a:t>
+            </a:r>
+            <a:endParaRPr lang="en-US" dirty="0"/>
+          </a:p>
+          <a:p>
             <a:r>
               <a:rPr lang="en-US" dirty="0"/>
-              <a:t>Free Code Camp</a:t>
+              <a:t>Hangman</a:t>
             </a:r>
           </a:p>
           <a:p>
             <a:r>
               <a:rPr lang="en-US" dirty="0"/>
-              <a:t>Flexbox Froggy</a:t>
+              <a:t>Jacks are Junk</a:t>
             </a:r>
           </a:p>
           <a:p>
             <a:r>
               <a:rPr lang="en-US" dirty="0"/>
-              <a:t>Grid Garden</a:t>
+              <a:t>Math Bingo</a:t>
             </a:r>
           </a:p>
           <a:p>
             <a:r>
               <a:rPr lang="en-US" dirty="0"/>
-              <a:t>Microsoft Learn</a:t>
+              <a:t>Ella School</a:t>
             </a:r>
           </a:p>
           <a:p>
             <a:r>
               <a:rPr lang="en-US" dirty="0"/>
-              <a:t>Tim Corey C# Challenge using GitHub OSS</a:t>
-            </a:r>
-          </a:p>
-          <a:p>
-            <a:pPr lvl="1"/>
+              <a:t>Binary Puzzle Solver</a:t>
+            </a:r>
+          </a:p>
+          <a:p>
             <a:r>
               <a:rPr lang="en-US" dirty="0" err="1"/>
-              <a:t>Wuphf</a:t>
+              <a:t>Ellabit</a:t>
+            </a:r>
+            <a:r>
+              <a:rPr lang="en-US" dirty="0"/>
+              <a:t> </a:t>
+            </a:r>
+            <a:r>
+              <a:rPr lang="en-US" dirty="0">
+                <a:hlinkClick r:id="rId2"/>
+              </a:rPr>
+              <a:t>https://kevmoens.github.io/Ellabit</a:t>
             </a:r>
             <a:endParaRPr lang="en-US" dirty="0"/>
           </a:p>
@@ -6252,7 +6236,7 @@
     </p:spTree>
     <p:extLst>
       <p:ext uri="{BB962C8B-B14F-4D97-AF65-F5344CB8AC3E}">
-        <p14:creationId xmlns:p14="http://schemas.microsoft.com/office/powerpoint/2010/main" val="1325740911"/>
+        <p14:creationId xmlns:p14="http://schemas.microsoft.com/office/powerpoint/2010/main" val="4238399885"/>
       </p:ext>
     </p:extLst>
   </p:cSld>
@@ -6343,7 +6327,7 @@
           <a:lstStyle/>
           <a:p>
             <a:pPr algn="ctr"/>
-            <a:endParaRPr lang="en-US"/>
+            <a:endParaRPr lang="en-US" dirty="0"/>
           </a:p>
         </p:txBody>
       </p:sp>
@@ -6477,7 +6461,7 @@
           <a:lstStyle/>
           <a:p>
             <a:pPr algn="ctr"/>
-            <a:endParaRPr lang="en-US"/>
+            <a:endParaRPr lang="en-US" dirty="0"/>
           </a:p>
         </p:txBody>
       </p:sp>
@@ -6499,8 +6483,8 @@
         </p:nvSpPr>
         <p:spPr>
           <a:xfrm>
-            <a:off x="686834" y="1153572"/>
-            <a:ext cx="3200400" cy="4461163"/>
+            <a:off x="177800" y="1198418"/>
+            <a:ext cx="3606800" cy="4461163"/>
           </a:xfrm>
         </p:spPr>
         <p:txBody>
@@ -6509,19 +6493,15 @@
           </a:bodyPr>
           <a:lstStyle/>
           <a:p>
-            <a:r>
-              <a:rPr lang="en-US" dirty="0" err="1">
+            <a:pPr algn="ctr"/>
+            <a:r>
+              <a:rPr lang="en-US" dirty="0">
                 <a:solidFill>
                   <a:srgbClr val="FFFFFF"/>
                 </a:solidFill>
               </a:rPr>
-              <a:t>Blazor</a:t>
-            </a:r>
-            <a:endParaRPr lang="en-US" dirty="0">
-              <a:solidFill>
-                <a:srgbClr val="FFFFFF"/>
-              </a:solidFill>
-            </a:endParaRPr>
+              <a:t>How we started</a:t>
+            </a:r>
           </a:p>
         </p:txBody>
       </p:sp>
@@ -6604,8 +6584,8 @@
         </p:nvSpPr>
         <p:spPr>
           <a:xfrm>
-            <a:off x="4447308" y="636190"/>
-            <a:ext cx="6906491" cy="5585619"/>
+            <a:off x="4447308" y="965200"/>
+            <a:ext cx="6906491" cy="5211763"/>
           </a:xfrm>
         </p:spPr>
         <p:txBody>
@@ -6614,72 +6594,80 @@
           </a:bodyPr>
           <a:lstStyle/>
           <a:p>
-            <a:pPr marL="0" indent="0" algn="ctr">
+            <a:r>
+              <a:rPr lang="en-US" dirty="0"/>
+              <a:t>Age 6 Scratch and Hour of Code</a:t>
+            </a:r>
+          </a:p>
+          <a:p>
+            <a:r>
+              <a:rPr lang="en-US" dirty="0"/>
+              <a:t>Age 7 Subscription Boxes </a:t>
+            </a:r>
+            <a:r>
+              <a:rPr lang="en-US" dirty="0" err="1"/>
+              <a:t>KiwiCo</a:t>
+            </a:r>
+            <a:r>
+              <a:rPr lang="en-US" dirty="0"/>
+              <a:t>/</a:t>
+            </a:r>
+            <a:r>
+              <a:rPr lang="en-US" dirty="0" err="1"/>
+              <a:t>MakerBlock</a:t>
+            </a:r>
+            <a:endParaRPr lang="en-US" dirty="0"/>
+          </a:p>
+          <a:p>
+            <a:r>
+              <a:rPr lang="en-US" dirty="0"/>
+              <a:t>Age 8/9 C# Console Apps</a:t>
+            </a:r>
+          </a:p>
+          <a:p>
+            <a:r>
+              <a:rPr lang="en-US" dirty="0"/>
+              <a:t>Age 9 Unity</a:t>
+            </a:r>
+          </a:p>
+          <a:p>
+            <a:r>
+              <a:rPr lang="en-US" dirty="0"/>
+              <a:t>Age 10+ HTML/Web/</a:t>
+            </a:r>
+            <a:r>
+              <a:rPr lang="en-US" dirty="0" err="1"/>
+              <a:t>Blazor</a:t>
+            </a:r>
+            <a:endParaRPr lang="en-US" dirty="0"/>
+          </a:p>
+          <a:p>
+            <a:r>
+              <a:rPr lang="en-US" dirty="0"/>
+              <a:t>End Goal  C# </a:t>
+            </a:r>
+            <a:r>
+              <a:rPr lang="en-US" dirty="0" err="1"/>
+              <a:t>Blazor</a:t>
+            </a:r>
+            <a:r>
+              <a:rPr lang="en-US" dirty="0"/>
+              <a:t> Web API</a:t>
+            </a:r>
+          </a:p>
+          <a:p>
+            <a:pPr marL="0" indent="0">
               <a:buNone/>
             </a:pPr>
-            <a:r>
-              <a:rPr lang="en-US" sz="3200" dirty="0"/>
-              <a:t>Projects</a:t>
-            </a:r>
-            <a:endParaRPr lang="en-US" dirty="0"/>
-          </a:p>
-          <a:p>
-            <a:r>
-              <a:rPr lang="en-US" dirty="0" err="1"/>
-              <a:t>Madlibs</a:t>
-            </a:r>
-            <a:endParaRPr lang="en-US" dirty="0"/>
-          </a:p>
-          <a:p>
-            <a:r>
-              <a:rPr lang="en-US" dirty="0"/>
-              <a:t>Hangman</a:t>
-            </a:r>
-          </a:p>
-          <a:p>
-            <a:r>
-              <a:rPr lang="en-US" dirty="0"/>
-              <a:t>Jacks are Junk</a:t>
-            </a:r>
-          </a:p>
-          <a:p>
-            <a:r>
-              <a:rPr lang="en-US" dirty="0"/>
-              <a:t>Math Bingo</a:t>
-            </a:r>
-          </a:p>
-          <a:p>
-            <a:r>
-              <a:rPr lang="en-US" dirty="0"/>
-              <a:t>Ella School</a:t>
-            </a:r>
-          </a:p>
-          <a:p>
-            <a:r>
-              <a:rPr lang="en-US" dirty="0"/>
-              <a:t>Binary Puzzle Solver</a:t>
-            </a:r>
-          </a:p>
-          <a:p>
-            <a:r>
-              <a:rPr lang="en-US" dirty="0"/>
-              <a:t>Choose your own adventure</a:t>
-            </a:r>
-          </a:p>
-          <a:p>
-            <a:r>
-              <a:rPr lang="en-US" dirty="0" err="1"/>
-              <a:t>Ellabit</a:t>
-            </a:r>
-            <a:r>
-              <a:rPr lang="en-US" dirty="0"/>
-              <a:t> </a:t>
-            </a:r>
-            <a:r>
-              <a:rPr lang="en-US" dirty="0">
-                <a:hlinkClick r:id="rId2"/>
-              </a:rPr>
-              <a:t>https://kevmoens.github.io/Ellabit</a:t>
+            <a:endParaRPr lang="en-US" sz="2000" dirty="0"/>
+          </a:p>
+          <a:p>
+            <a:pPr marL="0" indent="0">
+              <a:buNone/>
+            </a:pPr>
+            <a:r>
+              <a:rPr lang="en-US" sz="2000" dirty="0"/>
+              <a:t>10 years old is the optimal time to learn programming.  Yet the earlier the better.</a:t>
             </a:r>
             <a:endParaRPr lang="en-US" dirty="0"/>
           </a:p>
@@ -6688,7 +6676,7 @@
     </p:spTree>
     <p:extLst>
       <p:ext uri="{BB962C8B-B14F-4D97-AF65-F5344CB8AC3E}">
-        <p14:creationId xmlns:p14="http://schemas.microsoft.com/office/powerpoint/2010/main" val="4238399885"/>
+        <p14:creationId xmlns:p14="http://schemas.microsoft.com/office/powerpoint/2010/main" val="3799559141"/>
       </p:ext>
     </p:extLst>
   </p:cSld>
@@ -7602,10 +7590,10 @@
       </p:sp>
       <p:pic>
         <p:nvPicPr>
-          <p:cNvPr id="9" name="Content Placeholder 8">
-            <a:extLst>
-              <a:ext uri="{FF2B5EF4-FFF2-40B4-BE49-F238E27FC236}">
-                <a16:creationId xmlns:a16="http://schemas.microsoft.com/office/drawing/2014/main" id="{7EBBECC0-91A8-8BCB-A751-BC87E6064309}"/>
+          <p:cNvPr id="19" name="Content Placeholder 18">
+            <a:extLst>
+              <a:ext uri="{FF2B5EF4-FFF2-40B4-BE49-F238E27FC236}">
+                <a16:creationId xmlns:a16="http://schemas.microsoft.com/office/drawing/2014/main" id="{1FD2A894-268E-D2E7-7FB1-23E75CA0AE23}"/>
               </a:ext>
             </a:extLst>
           </p:cNvPr>
@@ -7630,8 +7618,8 @@
         </p:blipFill>
         <p:spPr>
           <a:xfrm>
-            <a:off x="0" y="0"/>
-            <a:ext cx="13007153" cy="7137400"/>
+            <a:off x="-26895" y="-8965"/>
+            <a:ext cx="13069005" cy="7252447"/>
           </a:xfrm>
         </p:spPr>
       </p:pic>
@@ -10198,7 +10186,7 @@
           <a:p>
             <a:r>
               <a:rPr lang="en-US" dirty="0"/>
-              <a:t>Each step is represented by blocks or ovals and connected b lines or arrows.</a:t>
+              <a:t>Each step is represented by blocks or ovals and connected by lines or arrows.</a:t>
             </a:r>
           </a:p>
           <a:p>
@@ -14573,7 +14561,7 @@
             </a:pPr>
             <a:r>
               <a:rPr lang="en-US" sz="2200" dirty="0"/>
-              <a:t>Teach persistence / Perseverance</a:t>
+              <a:t>Problem Solving / logic skills</a:t>
             </a:r>
           </a:p>
           <a:p>
@@ -14613,7 +14601,7 @@
             </a:pPr>
             <a:r>
               <a:rPr lang="en-US" sz="2200" dirty="0"/>
-              <a:t>Problem Solving / logic skills</a:t>
+              <a:t>Communication skills</a:t>
             </a:r>
           </a:p>
           <a:p>
@@ -14623,8 +14611,15 @@
             </a:pPr>
             <a:r>
               <a:rPr lang="en-US" sz="2200" dirty="0"/>
-              <a:t>Communication skills</a:t>
-            </a:r>
+              <a:t>Teach persistence / Perseverance</a:t>
+            </a:r>
+          </a:p>
+          <a:p>
+            <a:pPr marL="457200" indent="-457200">
+              <a:buFont typeface="+mj-lt"/>
+              <a:buAutoNum type="arabicPeriod"/>
+            </a:pPr>
+            <a:endParaRPr lang="en-US" sz="2200" dirty="0"/>
           </a:p>
           <a:p>
             <a:pPr marL="457200" indent="-457200">
@@ -16161,7 +16156,7 @@
           <a:p>
             <a:r>
               <a:rPr lang="en-US" dirty="0"/>
-              <a:t>Hour of Code</a:t>
+              <a:t>Code.org</a:t>
             </a:r>
           </a:p>
           <a:p>

</xml_diff>